<commit_message>
Don't know whats up with sidebar that doesn't scroll to bottom
</commit_message>
<xml_diff>
--- a/public/pitchSlides.pptx
+++ b/public/pitchSlides.pptx
@@ -1548,49 +1548,7 @@
                 </a:uFill>
                 <a:latin typeface="Arial"/>
               </a:rPr>
-              <a:t>Click to </a:t>
-            </a:r>
-            <a:r>
-              <a:rPr b="0" lang="en-US" sz="4400" spc="-1" strike="noStrike">
-                <a:solidFill>
-                  <a:srgbClr val="000000"/>
-                </a:solidFill>
-                <a:uFill>
-                  <a:solidFill>
-                    <a:srgbClr val="ffffff"/>
-                  </a:solidFill>
-                </a:uFill>
-                <a:latin typeface="Arial"/>
-              </a:rPr>
-              <a:t>edit the </a:t>
-            </a:r>
-            <a:r>
-              <a:rPr b="0" lang="en-US" sz="4400" spc="-1" strike="noStrike">
-                <a:solidFill>
-                  <a:srgbClr val="000000"/>
-                </a:solidFill>
-                <a:uFill>
-                  <a:solidFill>
-                    <a:srgbClr val="ffffff"/>
-                  </a:solidFill>
-                </a:uFill>
-                <a:latin typeface="Arial"/>
-              </a:rPr>
-              <a:t>title text </a:t>
-            </a:r>
-            <a:r>
-              <a:rPr b="0" lang="en-US" sz="4400" spc="-1" strike="noStrike">
-                <a:solidFill>
-                  <a:srgbClr val="000000"/>
-                </a:solidFill>
-                <a:uFill>
-                  <a:solidFill>
-                    <a:srgbClr val="ffffff"/>
-                  </a:solidFill>
-                </a:uFill>
-                <a:latin typeface="Arial"/>
-              </a:rPr>
-              <a:t>format</a:t>
+              <a:t>Click to edit the title text format</a:t>
             </a:r>
             <a:endParaRPr b="0" lang="en-US" sz="4400" spc="-1" strike="noStrike">
               <a:solidFill>
@@ -1998,7 +1956,7 @@
           <a:bodyPr lIns="0" rIns="0" tIns="0" bIns="0"/>
           <a:p>
             <a:pPr algn="r"/>
-            <a:fld id="{45365796-A120-49E4-A67C-9C3535B17209}" type="slidenum">
+            <a:fld id="{66F0BCE8-1A86-4D2D-8EE3-9D6480D3A9CB}" type="slidenum">
               <a:rPr b="0" lang="en-US" sz="1400" spc="-1" strike="noStrike">
                 <a:solidFill>
                   <a:srgbClr val="000000"/>
@@ -2098,7 +2056,21 @@
                 </a:uFill>
                 <a:latin typeface="Verdana"/>
               </a:rPr>
-              <a:t>CrowdFunding, CrowdSelling, CrowdEngagement</a:t>
+              <a:t>CrowdFunding, CrowdSelling, </a:t>
+            </a:r>
+            <a:r>
+              <a:rPr b="0" lang="en-US" sz="3200" spc="-1" strike="noStrike">
+                <a:solidFill>
+                  <a:srgbClr val="3c2154"/>
+                </a:solidFill>
+                <a:uFill>
+                  <a:solidFill>
+                    <a:srgbClr val="ffffff"/>
+                  </a:solidFill>
+                </a:uFill>
+                <a:latin typeface="Verdana"/>
+              </a:rPr>
+              <a:t>CrowdEngagement</a:t>
             </a:r>
             <a:endParaRPr b="0" lang="en-US" sz="3200" spc="-1" strike="noStrike">
               <a:solidFill>
@@ -2894,8 +2866,34 @@
                 </a:uFill>
                 <a:latin typeface="Verdana"/>
               </a:rPr>
-              <a:t>Book authors are </a:t>
-            </a:r>
+              <a:t>Book authors are being undervalued by current online selling practices</a:t>
+            </a:r>
+            <a:endParaRPr b="0" lang="en-US" sz="3200" spc="-1" strike="noStrike">
+              <a:solidFill>
+                <a:srgbClr val="000000"/>
+              </a:solidFill>
+              <a:uFill>
+                <a:solidFill>
+                  <a:srgbClr val="ffffff"/>
+                </a:solidFill>
+              </a:uFill>
+              <a:latin typeface="Arial"/>
+            </a:endParaRPr>
+          </a:p>
+          <a:p>
+            <a:endParaRPr b="0" lang="en-US" sz="3200" spc="-1" strike="noStrike">
+              <a:solidFill>
+                <a:srgbClr val="000000"/>
+              </a:solidFill>
+              <a:uFill>
+                <a:solidFill>
+                  <a:srgbClr val="ffffff"/>
+                </a:solidFill>
+              </a:uFill>
+              <a:latin typeface="Arial"/>
+            </a:endParaRPr>
+          </a:p>
+          <a:p>
             <a:r>
               <a:rPr b="0" lang="en-US" sz="3200" spc="-1" strike="noStrike">
                 <a:solidFill>
@@ -2908,8 +2906,34 @@
                 </a:uFill>
                 <a:latin typeface="Verdana"/>
               </a:rPr>
-              <a:t>being undervalued by </a:t>
-            </a:r>
+              <a:t>Most places that sell authors’ products only offer the books</a:t>
+            </a:r>
+            <a:endParaRPr b="0" lang="en-US" sz="3200" spc="-1" strike="noStrike">
+              <a:solidFill>
+                <a:srgbClr val="000000"/>
+              </a:solidFill>
+              <a:uFill>
+                <a:solidFill>
+                  <a:srgbClr val="ffffff"/>
+                </a:solidFill>
+              </a:uFill>
+              <a:latin typeface="Arial"/>
+            </a:endParaRPr>
+          </a:p>
+          <a:p>
+            <a:endParaRPr b="0" lang="en-US" sz="3200" spc="-1" strike="noStrike">
+              <a:solidFill>
+                <a:srgbClr val="000000"/>
+              </a:solidFill>
+              <a:uFill>
+                <a:solidFill>
+                  <a:srgbClr val="ffffff"/>
+                </a:solidFill>
+              </a:uFill>
+              <a:latin typeface="Arial"/>
+            </a:endParaRPr>
+          </a:p>
+          <a:p>
             <a:r>
               <a:rPr b="0" lang="en-US" sz="3200" spc="-1" strike="noStrike">
                 <a:solidFill>
@@ -2922,143 +2946,7 @@
                 </a:uFill>
                 <a:latin typeface="Verdana"/>
               </a:rPr>
-              <a:t>current online selling </a:t>
-            </a:r>
-            <a:r>
-              <a:rPr b="0" lang="en-US" sz="3200" spc="-1" strike="noStrike">
-                <a:solidFill>
-                  <a:srgbClr val="3c2154"/>
-                </a:solidFill>
-                <a:uFill>
-                  <a:solidFill>
-                    <a:srgbClr val="ffffff"/>
-                  </a:solidFill>
-                </a:uFill>
-                <a:latin typeface="Verdana"/>
-              </a:rPr>
-              <a:t>practices</a:t>
-            </a:r>
-            <a:endParaRPr b="0" lang="en-US" sz="3200" spc="-1" strike="noStrike">
-              <a:solidFill>
-                <a:srgbClr val="000000"/>
-              </a:solidFill>
-              <a:uFill>
-                <a:solidFill>
-                  <a:srgbClr val="ffffff"/>
-                </a:solidFill>
-              </a:uFill>
-              <a:latin typeface="Arial"/>
-            </a:endParaRPr>
-          </a:p>
-          <a:p>
-            <a:endParaRPr b="0" lang="en-US" sz="3200" spc="-1" strike="noStrike">
-              <a:solidFill>
-                <a:srgbClr val="000000"/>
-              </a:solidFill>
-              <a:uFill>
-                <a:solidFill>
-                  <a:srgbClr val="ffffff"/>
-                </a:solidFill>
-              </a:uFill>
-              <a:latin typeface="Arial"/>
-            </a:endParaRPr>
-          </a:p>
-          <a:p>
-            <a:r>
-              <a:rPr b="0" lang="en-US" sz="3200" spc="-1" strike="noStrike">
-                <a:solidFill>
-                  <a:srgbClr val="3c2154"/>
-                </a:solidFill>
-                <a:uFill>
-                  <a:solidFill>
-                    <a:srgbClr val="ffffff"/>
-                  </a:solidFill>
-                </a:uFill>
-                <a:latin typeface="Verdana"/>
-              </a:rPr>
-              <a:t>Most places that sell </a:t>
-            </a:r>
-            <a:r>
-              <a:rPr b="0" lang="en-US" sz="3200" spc="-1" strike="noStrike">
-                <a:solidFill>
-                  <a:srgbClr val="3c2154"/>
-                </a:solidFill>
-                <a:uFill>
-                  <a:solidFill>
-                    <a:srgbClr val="ffffff"/>
-                  </a:solidFill>
-                </a:uFill>
-                <a:latin typeface="Verdana"/>
-              </a:rPr>
-              <a:t>authors’ products only </a:t>
-            </a:r>
-            <a:r>
-              <a:rPr b="0" lang="en-US" sz="3200" spc="-1" strike="noStrike">
-                <a:solidFill>
-                  <a:srgbClr val="3c2154"/>
-                </a:solidFill>
-                <a:uFill>
-                  <a:solidFill>
-                    <a:srgbClr val="ffffff"/>
-                  </a:solidFill>
-                </a:uFill>
-                <a:latin typeface="Verdana"/>
-              </a:rPr>
-              <a:t>offer the books</a:t>
-            </a:r>
-            <a:endParaRPr b="0" lang="en-US" sz="3200" spc="-1" strike="noStrike">
-              <a:solidFill>
-                <a:srgbClr val="000000"/>
-              </a:solidFill>
-              <a:uFill>
-                <a:solidFill>
-                  <a:srgbClr val="ffffff"/>
-                </a:solidFill>
-              </a:uFill>
-              <a:latin typeface="Arial"/>
-            </a:endParaRPr>
-          </a:p>
-          <a:p>
-            <a:endParaRPr b="0" lang="en-US" sz="3200" spc="-1" strike="noStrike">
-              <a:solidFill>
-                <a:srgbClr val="000000"/>
-              </a:solidFill>
-              <a:uFill>
-                <a:solidFill>
-                  <a:srgbClr val="ffffff"/>
-                </a:solidFill>
-              </a:uFill>
-              <a:latin typeface="Arial"/>
-            </a:endParaRPr>
-          </a:p>
-          <a:p>
-            <a:r>
-              <a:rPr b="0" lang="en-US" sz="3200" spc="-1" strike="noStrike">
-                <a:solidFill>
-                  <a:srgbClr val="3c2154"/>
-                </a:solidFill>
-                <a:uFill>
-                  <a:solidFill>
-                    <a:srgbClr val="ffffff"/>
-                  </a:solidFill>
-                </a:uFill>
-                <a:latin typeface="Verdana"/>
-              </a:rPr>
-              <a:t>Marketing is time </a:t>
-            </a:r>
-            <a:r>
-              <a:rPr b="0" lang="en-US" sz="3200" spc="-1" strike="noStrike">
-                <a:solidFill>
-                  <a:srgbClr val="3c2154"/>
-                </a:solidFill>
-                <a:uFill>
-                  <a:solidFill>
-                    <a:srgbClr val="ffffff"/>
-                  </a:solidFill>
-                </a:uFill>
-                <a:latin typeface="Verdana"/>
-              </a:rPr>
-              <a:t>consuming</a:t>
+              <a:t>Marketing is time consuming</a:t>
             </a:r>
             <a:endParaRPr b="0" lang="en-US" sz="3200" spc="-1" strike="noStrike">
               <a:solidFill>
@@ -4270,7 +4158,21 @@
                 </a:uFill>
                 <a:latin typeface="Verdana"/>
               </a:rPr>
-              <a:t>(for authors)</a:t>
+              <a:t>(for </a:t>
+            </a:r>
+            <a:r>
+              <a:rPr b="0" lang="en-US" sz="3800" spc="-1" strike="noStrike">
+                <a:solidFill>
+                  <a:srgbClr val="3c2154"/>
+                </a:solidFill>
+                <a:uFill>
+                  <a:solidFill>
+                    <a:srgbClr val="ffffff"/>
+                  </a:solidFill>
+                </a:uFill>
+                <a:latin typeface="Verdana"/>
+              </a:rPr>
+              <a:t>authors)</a:t>
             </a:r>
             <a:endParaRPr b="1" lang="en-US" sz="4400" spc="-1" strike="noStrike">
               <a:solidFill>
@@ -4885,21 +4787,7 @@
                 </a:uFill>
                 <a:latin typeface="Verdana"/>
               </a:rPr>
-              <a:t>Business </a:t>
-            </a:r>
-            <a:r>
-              <a:rPr b="1" lang="en-US" sz="4400" spc="-1" strike="noStrike">
-                <a:solidFill>
-                  <a:srgbClr val="3c2154"/>
-                </a:solidFill>
-                <a:uFill>
-                  <a:solidFill>
-                    <a:srgbClr val="ffffff"/>
-                  </a:solidFill>
-                </a:uFill>
-                <a:latin typeface="Verdana"/>
-              </a:rPr>
-              <a:t>Model</a:t>
+              <a:t>Business Model</a:t>
             </a:r>
             <a:endParaRPr b="1" lang="en-US" sz="4400" spc="-1" strike="noStrike">
               <a:solidFill>
@@ -4950,8 +4838,48 @@
                 </a:uFill>
                 <a:latin typeface="Verdana"/>
               </a:rPr>
-              <a:t>We take 5% </a:t>
-            </a:r>
+              <a:t>We take 5% commission.</a:t>
+            </a:r>
+            <a:endParaRPr b="0" lang="en-US" sz="3200" spc="-1" strike="noStrike">
+              <a:solidFill>
+                <a:srgbClr val="000000"/>
+              </a:solidFill>
+              <a:uFill>
+                <a:solidFill>
+                  <a:srgbClr val="ffffff"/>
+                </a:solidFill>
+              </a:uFill>
+              <a:latin typeface="Arial"/>
+            </a:endParaRPr>
+          </a:p>
+          <a:p>
+            <a:r>
+              <a:rPr b="0" lang="en-US" sz="1600" spc="-1" strike="noStrike">
+                <a:solidFill>
+                  <a:srgbClr val="3c2154"/>
+                </a:solidFill>
+                <a:uFill>
+                  <a:solidFill>
+                    <a:srgbClr val="ffffff"/>
+                  </a:solidFill>
+                </a:uFill>
+                <a:latin typeface="Verdana"/>
+              </a:rPr>
+              <a:t> </a:t>
+            </a:r>
+            <a:endParaRPr b="0" lang="en-US" sz="3200" spc="-1" strike="noStrike">
+              <a:solidFill>
+                <a:srgbClr val="000000"/>
+              </a:solidFill>
+              <a:uFill>
+                <a:solidFill>
+                  <a:srgbClr val="ffffff"/>
+                </a:solidFill>
+              </a:uFill>
+              <a:latin typeface="Arial"/>
+            </a:endParaRPr>
+          </a:p>
+          <a:p>
             <a:r>
               <a:rPr b="0" lang="en-US" sz="3200" spc="-1" strike="noStrike">
                 <a:solidFill>
@@ -4964,7 +4892,7 @@
                 </a:uFill>
                 <a:latin typeface="Verdana"/>
               </a:rPr>
-              <a:t>commission.</a:t>
+              <a:t>Future extra fees for:</a:t>
             </a:r>
             <a:endParaRPr b="0" lang="en-US" sz="3200" spc="-1" strike="noStrike">
               <a:solidFill>
@@ -5007,60 +4935,6 @@
           </a:p>
           <a:p>
             <a:r>
-              <a:rPr b="0" lang="en-US" sz="3200" spc="-1" strike="noStrike">
-                <a:solidFill>
-                  <a:srgbClr val="3c2154"/>
-                </a:solidFill>
-                <a:uFill>
-                  <a:solidFill>
-                    <a:srgbClr val="ffffff"/>
-                  </a:solidFill>
-                </a:uFill>
-                <a:latin typeface="Verdana"/>
-              </a:rPr>
-              <a:t>Future extra fees for:</a:t>
-            </a:r>
-            <a:endParaRPr b="0" lang="en-US" sz="3200" spc="-1" strike="noStrike">
-              <a:solidFill>
-                <a:srgbClr val="000000"/>
-              </a:solidFill>
-              <a:uFill>
-                <a:solidFill>
-                  <a:srgbClr val="ffffff"/>
-                </a:solidFill>
-              </a:uFill>
-              <a:latin typeface="Arial"/>
-            </a:endParaRPr>
-          </a:p>
-          <a:p>
-            <a:r>
-              <a:rPr b="0" lang="en-US" sz="1600" spc="-1" strike="noStrike">
-                <a:solidFill>
-                  <a:srgbClr val="3c2154"/>
-                </a:solidFill>
-                <a:uFill>
-                  <a:solidFill>
-                    <a:srgbClr val="ffffff"/>
-                  </a:solidFill>
-                </a:uFill>
-                <a:latin typeface="Verdana"/>
-              </a:rPr>
-              <a:t> </a:t>
-            </a:r>
-            <a:endParaRPr b="0" lang="en-US" sz="3200" spc="-1" strike="noStrike">
-              <a:solidFill>
-                <a:srgbClr val="000000"/>
-              </a:solidFill>
-              <a:uFill>
-                <a:solidFill>
-                  <a:srgbClr val="ffffff"/>
-                </a:solidFill>
-              </a:uFill>
-              <a:latin typeface="Arial"/>
-            </a:endParaRPr>
-          </a:p>
-          <a:p>
-            <a:r>
               <a:rPr b="0" i="1" lang="en-US" sz="2400" spc="-1" strike="noStrike">
                 <a:solidFill>
                   <a:srgbClr val="3c2154"/>
@@ -5113,8 +4987,21 @@
                 </a:uFill>
                 <a:latin typeface="Verdana"/>
               </a:rPr>
-              <a:t>Get featured in sidebars, </a:t>
-            </a:r>
+              <a:t>Get featured in sidebars, home page </a:t>
+            </a:r>
+            <a:endParaRPr b="0" lang="en-US" sz="1200" spc="-1" strike="noStrike">
+              <a:solidFill>
+                <a:srgbClr val="000000"/>
+              </a:solidFill>
+              <a:uFill>
+                <a:solidFill>
+                  <a:srgbClr val="ffffff"/>
+                </a:solidFill>
+              </a:uFill>
+              <a:latin typeface="Arial"/>
+            </a:endParaRPr>
+          </a:p>
+          <a:p>
             <a:r>
               <a:rPr b="0" lang="en-US" sz="2400" spc="-1" strike="noStrike">
                 <a:solidFill>
@@ -5127,7 +5014,7 @@
                 </a:uFill>
                 <a:latin typeface="Verdana"/>
               </a:rPr>
-              <a:t>home page </a:t>
+              <a:t>Livestreaming</a:t>
             </a:r>
             <a:endParaRPr b="0" lang="en-US" sz="1200" spc="-1" strike="noStrike">
               <a:solidFill>
@@ -5154,48 +5041,7 @@
                 </a:uFill>
                 <a:latin typeface="Verdana"/>
               </a:rPr>
-              <a:t>Livestreaming</a:t>
-            </a:r>
-            <a:endParaRPr b="0" lang="en-US" sz="1200" spc="-1" strike="noStrike">
-              <a:solidFill>
-                <a:srgbClr val="000000"/>
-              </a:solidFill>
-              <a:uFill>
-                <a:solidFill>
-                  <a:srgbClr val="ffffff"/>
-                </a:solidFill>
-              </a:uFill>
-              <a:latin typeface="Arial"/>
-            </a:endParaRPr>
-          </a:p>
-          <a:p>
-            <a:r>
-              <a:rPr b="0" lang="en-US" sz="2400" spc="-1" strike="noStrike">
-                <a:solidFill>
-                  <a:srgbClr val="3c2154"/>
-                </a:solidFill>
-                <a:uFill>
-                  <a:solidFill>
-                    <a:srgbClr val="ffffff"/>
-                  </a:solidFill>
-                </a:uFill>
-                <a:latin typeface="Verdana"/>
-              </a:rPr>
-              <a:t>Maintaining fan email </a:t>
-            </a:r>
-            <a:r>
-              <a:rPr b="0" lang="en-US" sz="2400" spc="-1" strike="noStrike">
-                <a:solidFill>
-                  <a:srgbClr val="3c2154"/>
-                </a:solidFill>
-                <a:uFill>
-                  <a:solidFill>
-                    <a:srgbClr val="ffffff"/>
-                  </a:solidFill>
-                </a:uFill>
-                <a:latin typeface="Verdana"/>
-              </a:rPr>
-              <a:t>notifications</a:t>
+              <a:t>Maintaining fan email notifications</a:t>
             </a:r>
             <a:endParaRPr b="0" lang="en-US" sz="1200" spc="-1" strike="noStrike">
               <a:solidFill>

</xml_diff>